<commit_message>
Update Projet environnement de l'entreprise.pptx
</commit_message>
<xml_diff>
--- a/Projet environnement de l'entreprise.pptx
+++ b/Projet environnement de l'entreprise.pptx
@@ -28104,9 +28104,17 @@
               </a:spcAft>
               <a:buNone/>
             </a:pPr>
+            <a:r>
+              <a:rPr lang="fr-FR" sz="4800" b="1" dirty="0">
+                <a:solidFill>
+                  <a:schemeClr val="accent3"/>
+                </a:solidFill>
+              </a:rPr>
+              <a:t>Google</a:t>
+            </a:r>
             <a:endParaRPr sz="4800" b="1" dirty="0">
               <a:solidFill>
-                <a:schemeClr val="accent2"/>
+                <a:schemeClr val="accent3"/>
               </a:solidFill>
             </a:endParaRPr>
           </a:p>
@@ -28130,8 +28138,8 @@
         </p:nvSpPr>
         <p:spPr>
           <a:xfrm>
-            <a:off x="1506031" y="1100162"/>
-            <a:ext cx="6001200" cy="1840500"/>
+            <a:off x="1064904" y="866246"/>
+            <a:ext cx="6883454" cy="1840500"/>
           </a:xfrm>
         </p:spPr>
         <p:txBody>
@@ -28140,14 +28148,7 @@
           <a:p>
             <a:r>
               <a:rPr lang="fr-CA" sz="4400" dirty="0"/>
-              <a:t>Titre</a:t>
-            </a:r>
-            <a:br>
-              <a:rPr lang="fr-CA" sz="4400" dirty="0"/>
-            </a:br>
-            <a:r>
-              <a:rPr lang="fr-CA" sz="2400" i="1" dirty="0"/>
-              <a:t>Sous titre</a:t>
+              <a:t>Projet Environnement de l’entreprise</a:t>
             </a:r>
             <a:endParaRPr lang="fr-CA" sz="4400" i="1" dirty="0"/>
           </a:p>

</xml_diff>